<commit_message>
Deploying to gh-pages from @ luiz-ladeira/luiz-ladeira.github.io@8731a75d87e730a228942ac9de337ae28e60ace0 🚀
</commit_message>
<xml_diff>
--- a/assets/img/logos.pptx
+++ b/assets/img/logos.pptx
@@ -108,6 +108,11 @@
       </a:defRPr>
     </a:lvl9pPr>
   </p:defaultTextStyle>
+  <p:extLst>
+    <p:ext uri="{EFAFB233-063F-42B5-8137-9DF3F51BA10A}">
+      <p15:sldGuideLst xmlns:p15="http://schemas.microsoft.com/office/powerpoint/2012/main"/>
+    </p:ext>
+  </p:extLst>
 </p:presentation>
 </file>
 
@@ -3548,8 +3553,8 @@
         </p:blipFill>
         <p:spPr>
           <a:xfrm>
-            <a:off x="3582441" y="1439222"/>
-            <a:ext cx="4263639" cy="4263639"/>
+            <a:off x="3944056" y="1800837"/>
+            <a:ext cx="3540410" cy="3540410"/>
           </a:xfrm>
           <a:prstGeom prst="rect">
             <a:avLst/>

</xml_diff>